<commit_message>
hr portal section end project added
</commit_message>
<xml_diff>
--- a/Phase 4/Hospital Managment System   - Phase 3 end project screen short.pptx
+++ b/Phase 4/Hospital Managment System   - Phase 3 end project screen short.pptx
@@ -180,10 +180,9 @@
           </a:lstStyle>
           <a:p>
             <a:r>
-              <a:rPr lang="en-US" smtClean="0"/>
+              <a:rPr lang="en-US"/>
               <a:t>Click to edit Master title style</a:t>
             </a:r>
-            <a:endParaRPr lang="en-US"/>
           </a:p>
         </p:txBody>
       </p:sp>
@@ -245,10 +244,9 @@
           </a:lstStyle>
           <a:p>
             <a:r>
-              <a:rPr lang="en-US" smtClean="0"/>
+              <a:rPr lang="en-US"/>
               <a:t>Click to edit Master subtitle style</a:t>
             </a:r>
-            <a:endParaRPr lang="en-US"/>
           </a:p>
         </p:txBody>
       </p:sp>
@@ -269,7 +267,7 @@
           <a:p>
             <a:fld id="{95CF35B4-8310-4B5F-9FCA-57652201825D}" type="datetimeFigureOut">
               <a:rPr lang="en-US" smtClean="0"/>
-              <a:t>1/13/2023</a:t>
+              <a:t>11/17/2023</a:t>
             </a:fld>
             <a:endParaRPr lang="en-US"/>
           </a:p>
@@ -363,10 +361,9 @@
           <a:lstStyle/>
           <a:p>
             <a:r>
-              <a:rPr lang="en-US" smtClean="0"/>
+              <a:rPr lang="en-US"/>
               <a:t>Click to edit Master title style</a:t>
             </a:r>
-            <a:endParaRPr lang="en-US"/>
           </a:p>
         </p:txBody>
       </p:sp>
@@ -387,38 +384,37 @@
           <a:p>
             <a:pPr lvl="0"/>
             <a:r>
-              <a:rPr lang="en-US" smtClean="0"/>
+              <a:rPr lang="en-US"/>
               <a:t>Click to edit Master text styles</a:t>
             </a:r>
           </a:p>
           <a:p>
             <a:pPr lvl="1"/>
             <a:r>
-              <a:rPr lang="en-US" smtClean="0"/>
+              <a:rPr lang="en-US"/>
               <a:t>Second level</a:t>
             </a:r>
           </a:p>
           <a:p>
             <a:pPr lvl="2"/>
             <a:r>
-              <a:rPr lang="en-US" smtClean="0"/>
+              <a:rPr lang="en-US"/>
               <a:t>Third level</a:t>
             </a:r>
           </a:p>
           <a:p>
             <a:pPr lvl="3"/>
             <a:r>
-              <a:rPr lang="en-US" smtClean="0"/>
+              <a:rPr lang="en-US"/>
               <a:t>Fourth level</a:t>
             </a:r>
           </a:p>
           <a:p>
             <a:pPr lvl="4"/>
             <a:r>
-              <a:rPr lang="en-US" smtClean="0"/>
+              <a:rPr lang="en-US"/>
               <a:t>Fifth level</a:t>
             </a:r>
-            <a:endParaRPr lang="en-US"/>
           </a:p>
         </p:txBody>
       </p:sp>
@@ -439,7 +435,7 @@
           <a:p>
             <a:fld id="{95CF35B4-8310-4B5F-9FCA-57652201825D}" type="datetimeFigureOut">
               <a:rPr lang="en-US" smtClean="0"/>
-              <a:t>1/13/2023</a:t>
+              <a:t>11/17/2023</a:t>
             </a:fld>
             <a:endParaRPr lang="en-US"/>
           </a:p>
@@ -538,10 +534,9 @@
           <a:lstStyle/>
           <a:p>
             <a:r>
-              <a:rPr lang="en-US" smtClean="0"/>
+              <a:rPr lang="en-US"/>
               <a:t>Click to edit Master title style</a:t>
             </a:r>
-            <a:endParaRPr lang="en-US"/>
           </a:p>
         </p:txBody>
       </p:sp>
@@ -567,38 +562,37 @@
           <a:p>
             <a:pPr lvl="0"/>
             <a:r>
-              <a:rPr lang="en-US" smtClean="0"/>
+              <a:rPr lang="en-US"/>
               <a:t>Click to edit Master text styles</a:t>
             </a:r>
           </a:p>
           <a:p>
             <a:pPr lvl="1"/>
             <a:r>
-              <a:rPr lang="en-US" smtClean="0"/>
+              <a:rPr lang="en-US"/>
               <a:t>Second level</a:t>
             </a:r>
           </a:p>
           <a:p>
             <a:pPr lvl="2"/>
             <a:r>
-              <a:rPr lang="en-US" smtClean="0"/>
+              <a:rPr lang="en-US"/>
               <a:t>Third level</a:t>
             </a:r>
           </a:p>
           <a:p>
             <a:pPr lvl="3"/>
             <a:r>
-              <a:rPr lang="en-US" smtClean="0"/>
+              <a:rPr lang="en-US"/>
               <a:t>Fourth level</a:t>
             </a:r>
           </a:p>
           <a:p>
             <a:pPr lvl="4"/>
             <a:r>
-              <a:rPr lang="en-US" smtClean="0"/>
+              <a:rPr lang="en-US"/>
               <a:t>Fifth level</a:t>
             </a:r>
-            <a:endParaRPr lang="en-US"/>
           </a:p>
         </p:txBody>
       </p:sp>
@@ -619,7 +613,7 @@
           <a:p>
             <a:fld id="{95CF35B4-8310-4B5F-9FCA-57652201825D}" type="datetimeFigureOut">
               <a:rPr lang="en-US" smtClean="0"/>
-              <a:t>1/13/2023</a:t>
+              <a:t>11/17/2023</a:t>
             </a:fld>
             <a:endParaRPr lang="en-US"/>
           </a:p>
@@ -713,10 +707,9 @@
           <a:lstStyle/>
           <a:p>
             <a:r>
-              <a:rPr lang="en-US" smtClean="0"/>
+              <a:rPr lang="en-US"/>
               <a:t>Click to edit Master title style</a:t>
             </a:r>
-            <a:endParaRPr lang="en-US"/>
           </a:p>
         </p:txBody>
       </p:sp>
@@ -737,38 +730,37 @@
           <a:p>
             <a:pPr lvl="0"/>
             <a:r>
-              <a:rPr lang="en-US" smtClean="0"/>
+              <a:rPr lang="en-US"/>
               <a:t>Click to edit Master text styles</a:t>
             </a:r>
           </a:p>
           <a:p>
             <a:pPr lvl="1"/>
             <a:r>
-              <a:rPr lang="en-US" smtClean="0"/>
+              <a:rPr lang="en-US"/>
               <a:t>Second level</a:t>
             </a:r>
           </a:p>
           <a:p>
             <a:pPr lvl="2"/>
             <a:r>
-              <a:rPr lang="en-US" smtClean="0"/>
+              <a:rPr lang="en-US"/>
               <a:t>Third level</a:t>
             </a:r>
           </a:p>
           <a:p>
             <a:pPr lvl="3"/>
             <a:r>
-              <a:rPr lang="en-US" smtClean="0"/>
+              <a:rPr lang="en-US"/>
               <a:t>Fourth level</a:t>
             </a:r>
           </a:p>
           <a:p>
             <a:pPr lvl="4"/>
             <a:r>
-              <a:rPr lang="en-US" smtClean="0"/>
+              <a:rPr lang="en-US"/>
               <a:t>Fifth level</a:t>
             </a:r>
-            <a:endParaRPr lang="en-US"/>
           </a:p>
         </p:txBody>
       </p:sp>
@@ -789,7 +781,7 @@
           <a:p>
             <a:fld id="{95CF35B4-8310-4B5F-9FCA-57652201825D}" type="datetimeFigureOut">
               <a:rPr lang="en-US" smtClean="0"/>
-              <a:t>1/13/2023</a:t>
+              <a:t>11/17/2023</a:t>
             </a:fld>
             <a:endParaRPr lang="en-US"/>
           </a:p>
@@ -892,10 +884,9 @@
           </a:lstStyle>
           <a:p>
             <a:r>
-              <a:rPr lang="en-US" smtClean="0"/>
+              <a:rPr lang="en-US"/>
               <a:t>Click to edit Master title style</a:t>
             </a:r>
-            <a:endParaRPr lang="en-US"/>
           </a:p>
         </p:txBody>
       </p:sp>
@@ -1012,7 +1003,7 @@
           <a:p>
             <a:pPr lvl="0"/>
             <a:r>
-              <a:rPr lang="en-US" smtClean="0"/>
+              <a:rPr lang="en-US"/>
               <a:t>Click to edit Master text styles</a:t>
             </a:r>
           </a:p>
@@ -1035,7 +1026,7 @@
           <a:p>
             <a:fld id="{95CF35B4-8310-4B5F-9FCA-57652201825D}" type="datetimeFigureOut">
               <a:rPr lang="en-US" smtClean="0"/>
-              <a:t>1/13/2023</a:t>
+              <a:t>11/17/2023</a:t>
             </a:fld>
             <a:endParaRPr lang="en-US"/>
           </a:p>
@@ -1129,10 +1120,9 @@
           <a:lstStyle/>
           <a:p>
             <a:r>
-              <a:rPr lang="en-US" smtClean="0"/>
+              <a:rPr lang="en-US"/>
               <a:t>Click to edit Master title style</a:t>
             </a:r>
-            <a:endParaRPr lang="en-US"/>
           </a:p>
         </p:txBody>
       </p:sp>
@@ -1158,38 +1148,37 @@
           <a:p>
             <a:pPr lvl="0"/>
             <a:r>
-              <a:rPr lang="en-US" smtClean="0"/>
+              <a:rPr lang="en-US"/>
               <a:t>Click to edit Master text styles</a:t>
             </a:r>
           </a:p>
           <a:p>
             <a:pPr lvl="1"/>
             <a:r>
-              <a:rPr lang="en-US" smtClean="0"/>
+              <a:rPr lang="en-US"/>
               <a:t>Second level</a:t>
             </a:r>
           </a:p>
           <a:p>
             <a:pPr lvl="2"/>
             <a:r>
-              <a:rPr lang="en-US" smtClean="0"/>
+              <a:rPr lang="en-US"/>
               <a:t>Third level</a:t>
             </a:r>
           </a:p>
           <a:p>
             <a:pPr lvl="3"/>
             <a:r>
-              <a:rPr lang="en-US" smtClean="0"/>
+              <a:rPr lang="en-US"/>
               <a:t>Fourth level</a:t>
             </a:r>
           </a:p>
           <a:p>
             <a:pPr lvl="4"/>
             <a:r>
-              <a:rPr lang="en-US" smtClean="0"/>
+              <a:rPr lang="en-US"/>
               <a:t>Fifth level</a:t>
             </a:r>
-            <a:endParaRPr lang="en-US"/>
           </a:p>
         </p:txBody>
       </p:sp>
@@ -1215,38 +1204,37 @@
           <a:p>
             <a:pPr lvl="0"/>
             <a:r>
-              <a:rPr lang="en-US" smtClean="0"/>
+              <a:rPr lang="en-US"/>
               <a:t>Click to edit Master text styles</a:t>
             </a:r>
           </a:p>
           <a:p>
             <a:pPr lvl="1"/>
             <a:r>
-              <a:rPr lang="en-US" smtClean="0"/>
+              <a:rPr lang="en-US"/>
               <a:t>Second level</a:t>
             </a:r>
           </a:p>
           <a:p>
             <a:pPr lvl="2"/>
             <a:r>
-              <a:rPr lang="en-US" smtClean="0"/>
+              <a:rPr lang="en-US"/>
               <a:t>Third level</a:t>
             </a:r>
           </a:p>
           <a:p>
             <a:pPr lvl="3"/>
             <a:r>
-              <a:rPr lang="en-US" smtClean="0"/>
+              <a:rPr lang="en-US"/>
               <a:t>Fourth level</a:t>
             </a:r>
           </a:p>
           <a:p>
             <a:pPr lvl="4"/>
             <a:r>
-              <a:rPr lang="en-US" smtClean="0"/>
+              <a:rPr lang="en-US"/>
               <a:t>Fifth level</a:t>
             </a:r>
-            <a:endParaRPr lang="en-US"/>
           </a:p>
         </p:txBody>
       </p:sp>
@@ -1267,7 +1255,7 @@
           <a:p>
             <a:fld id="{95CF35B4-8310-4B5F-9FCA-57652201825D}" type="datetimeFigureOut">
               <a:rPr lang="en-US" smtClean="0"/>
-              <a:t>1/13/2023</a:t>
+              <a:t>11/17/2023</a:t>
             </a:fld>
             <a:endParaRPr lang="en-US"/>
           </a:p>
@@ -1366,10 +1354,9 @@
           <a:lstStyle/>
           <a:p>
             <a:r>
-              <a:rPr lang="en-US" smtClean="0"/>
+              <a:rPr lang="en-US"/>
               <a:t>Click to edit Master title style</a:t>
             </a:r>
-            <a:endParaRPr lang="en-US"/>
           </a:p>
         </p:txBody>
       </p:sp>
@@ -1432,7 +1419,7 @@
           <a:p>
             <a:pPr lvl="0"/>
             <a:r>
-              <a:rPr lang="en-US" smtClean="0"/>
+              <a:rPr lang="en-US"/>
               <a:t>Click to edit Master text styles</a:t>
             </a:r>
           </a:p>
@@ -1460,38 +1447,37 @@
           <a:p>
             <a:pPr lvl="0"/>
             <a:r>
-              <a:rPr lang="en-US" smtClean="0"/>
+              <a:rPr lang="en-US"/>
               <a:t>Click to edit Master text styles</a:t>
             </a:r>
           </a:p>
           <a:p>
             <a:pPr lvl="1"/>
             <a:r>
-              <a:rPr lang="en-US" smtClean="0"/>
+              <a:rPr lang="en-US"/>
               <a:t>Second level</a:t>
             </a:r>
           </a:p>
           <a:p>
             <a:pPr lvl="2"/>
             <a:r>
-              <a:rPr lang="en-US" smtClean="0"/>
+              <a:rPr lang="en-US"/>
               <a:t>Third level</a:t>
             </a:r>
           </a:p>
           <a:p>
             <a:pPr lvl="3"/>
             <a:r>
-              <a:rPr lang="en-US" smtClean="0"/>
+              <a:rPr lang="en-US"/>
               <a:t>Fourth level</a:t>
             </a:r>
           </a:p>
           <a:p>
             <a:pPr lvl="4"/>
             <a:r>
-              <a:rPr lang="en-US" smtClean="0"/>
+              <a:rPr lang="en-US"/>
               <a:t>Fifth level</a:t>
             </a:r>
-            <a:endParaRPr lang="en-US"/>
           </a:p>
         </p:txBody>
       </p:sp>
@@ -1554,7 +1540,7 @@
           <a:p>
             <a:pPr lvl="0"/>
             <a:r>
-              <a:rPr lang="en-US" smtClean="0"/>
+              <a:rPr lang="en-US"/>
               <a:t>Click to edit Master text styles</a:t>
             </a:r>
           </a:p>
@@ -1582,38 +1568,37 @@
           <a:p>
             <a:pPr lvl="0"/>
             <a:r>
-              <a:rPr lang="en-US" smtClean="0"/>
+              <a:rPr lang="en-US"/>
               <a:t>Click to edit Master text styles</a:t>
             </a:r>
           </a:p>
           <a:p>
             <a:pPr lvl="1"/>
             <a:r>
-              <a:rPr lang="en-US" smtClean="0"/>
+              <a:rPr lang="en-US"/>
               <a:t>Second level</a:t>
             </a:r>
           </a:p>
           <a:p>
             <a:pPr lvl="2"/>
             <a:r>
-              <a:rPr lang="en-US" smtClean="0"/>
+              <a:rPr lang="en-US"/>
               <a:t>Third level</a:t>
             </a:r>
           </a:p>
           <a:p>
             <a:pPr lvl="3"/>
             <a:r>
-              <a:rPr lang="en-US" smtClean="0"/>
+              <a:rPr lang="en-US"/>
               <a:t>Fourth level</a:t>
             </a:r>
           </a:p>
           <a:p>
             <a:pPr lvl="4"/>
             <a:r>
-              <a:rPr lang="en-US" smtClean="0"/>
+              <a:rPr lang="en-US"/>
               <a:t>Fifth level</a:t>
             </a:r>
-            <a:endParaRPr lang="en-US"/>
           </a:p>
         </p:txBody>
       </p:sp>
@@ -1634,7 +1619,7 @@
           <a:p>
             <a:fld id="{95CF35B4-8310-4B5F-9FCA-57652201825D}" type="datetimeFigureOut">
               <a:rPr lang="en-US" smtClean="0"/>
-              <a:t>1/13/2023</a:t>
+              <a:t>11/17/2023</a:t>
             </a:fld>
             <a:endParaRPr lang="en-US"/>
           </a:p>
@@ -1728,10 +1713,9 @@
           <a:lstStyle/>
           <a:p>
             <a:r>
-              <a:rPr lang="en-US" smtClean="0"/>
+              <a:rPr lang="en-US"/>
               <a:t>Click to edit Master title style</a:t>
             </a:r>
-            <a:endParaRPr lang="en-US"/>
           </a:p>
         </p:txBody>
       </p:sp>
@@ -1752,7 +1736,7 @@
           <a:p>
             <a:fld id="{95CF35B4-8310-4B5F-9FCA-57652201825D}" type="datetimeFigureOut">
               <a:rPr lang="en-US" smtClean="0"/>
-              <a:t>1/13/2023</a:t>
+              <a:t>11/17/2023</a:t>
             </a:fld>
             <a:endParaRPr lang="en-US"/>
           </a:p>
@@ -1847,7 +1831,7 @@
           <a:p>
             <a:fld id="{95CF35B4-8310-4B5F-9FCA-57652201825D}" type="datetimeFigureOut">
               <a:rPr lang="en-US" smtClean="0"/>
-              <a:t>1/13/2023</a:t>
+              <a:t>11/17/2023</a:t>
             </a:fld>
             <a:endParaRPr lang="en-US"/>
           </a:p>
@@ -1950,10 +1934,9 @@
           </a:lstStyle>
           <a:p>
             <a:r>
-              <a:rPr lang="en-US" smtClean="0"/>
+              <a:rPr lang="en-US"/>
               <a:t>Click to edit Master title style</a:t>
             </a:r>
-            <a:endParaRPr lang="en-US"/>
           </a:p>
         </p:txBody>
       </p:sp>
@@ -2007,38 +1990,37 @@
           <a:p>
             <a:pPr lvl="0"/>
             <a:r>
-              <a:rPr lang="en-US" smtClean="0"/>
+              <a:rPr lang="en-US"/>
               <a:t>Click to edit Master text styles</a:t>
             </a:r>
           </a:p>
           <a:p>
             <a:pPr lvl="1"/>
             <a:r>
-              <a:rPr lang="en-US" smtClean="0"/>
+              <a:rPr lang="en-US"/>
               <a:t>Second level</a:t>
             </a:r>
           </a:p>
           <a:p>
             <a:pPr lvl="2"/>
             <a:r>
-              <a:rPr lang="en-US" smtClean="0"/>
+              <a:rPr lang="en-US"/>
               <a:t>Third level</a:t>
             </a:r>
           </a:p>
           <a:p>
             <a:pPr lvl="3"/>
             <a:r>
-              <a:rPr lang="en-US" smtClean="0"/>
+              <a:rPr lang="en-US"/>
               <a:t>Fourth level</a:t>
             </a:r>
           </a:p>
           <a:p>
             <a:pPr lvl="4"/>
             <a:r>
-              <a:rPr lang="en-US" smtClean="0"/>
+              <a:rPr lang="en-US"/>
               <a:t>Fifth level</a:t>
             </a:r>
-            <a:endParaRPr lang="en-US"/>
           </a:p>
         </p:txBody>
       </p:sp>
@@ -2101,7 +2083,7 @@
           <a:p>
             <a:pPr lvl="0"/>
             <a:r>
-              <a:rPr lang="en-US" smtClean="0"/>
+              <a:rPr lang="en-US"/>
               <a:t>Click to edit Master text styles</a:t>
             </a:r>
           </a:p>
@@ -2124,7 +2106,7 @@
           <a:p>
             <a:fld id="{95CF35B4-8310-4B5F-9FCA-57652201825D}" type="datetimeFigureOut">
               <a:rPr lang="en-US" smtClean="0"/>
-              <a:t>1/13/2023</a:t>
+              <a:t>11/17/2023</a:t>
             </a:fld>
             <a:endParaRPr lang="en-US"/>
           </a:p>
@@ -2227,10 +2209,9 @@
           </a:lstStyle>
           <a:p>
             <a:r>
-              <a:rPr lang="en-US" smtClean="0"/>
+              <a:rPr lang="en-US"/>
               <a:t>Click to edit Master title style</a:t>
             </a:r>
-            <a:endParaRPr lang="en-US"/>
           </a:p>
         </p:txBody>
       </p:sp>
@@ -2354,7 +2335,7 @@
           <a:p>
             <a:pPr lvl="0"/>
             <a:r>
-              <a:rPr lang="en-US" smtClean="0"/>
+              <a:rPr lang="en-US"/>
               <a:t>Click to edit Master text styles</a:t>
             </a:r>
           </a:p>
@@ -2377,7 +2358,7 @@
           <a:p>
             <a:fld id="{95CF35B4-8310-4B5F-9FCA-57652201825D}" type="datetimeFigureOut">
               <a:rPr lang="en-US" smtClean="0"/>
-              <a:t>1/13/2023</a:t>
+              <a:t>11/17/2023</a:t>
             </a:fld>
             <a:endParaRPr lang="en-US"/>
           </a:p>
@@ -2486,10 +2467,9 @@
           <a:lstStyle/>
           <a:p>
             <a:r>
-              <a:rPr lang="en-US" smtClean="0"/>
+              <a:rPr lang="en-US"/>
               <a:t>Click to edit Master title style</a:t>
             </a:r>
-            <a:endParaRPr lang="en-US"/>
           </a:p>
         </p:txBody>
       </p:sp>
@@ -2520,38 +2500,37 @@
           <a:p>
             <a:pPr lvl="0"/>
             <a:r>
-              <a:rPr lang="en-US" smtClean="0"/>
+              <a:rPr lang="en-US"/>
               <a:t>Click to edit Master text styles</a:t>
             </a:r>
           </a:p>
           <a:p>
             <a:pPr lvl="1"/>
             <a:r>
-              <a:rPr lang="en-US" smtClean="0"/>
+              <a:rPr lang="en-US"/>
               <a:t>Second level</a:t>
             </a:r>
           </a:p>
           <a:p>
             <a:pPr lvl="2"/>
             <a:r>
-              <a:rPr lang="en-US" smtClean="0"/>
+              <a:rPr lang="en-US"/>
               <a:t>Third level</a:t>
             </a:r>
           </a:p>
           <a:p>
             <a:pPr lvl="3"/>
             <a:r>
-              <a:rPr lang="en-US" smtClean="0"/>
+              <a:rPr lang="en-US"/>
               <a:t>Fourth level</a:t>
             </a:r>
           </a:p>
           <a:p>
             <a:pPr lvl="4"/>
             <a:r>
-              <a:rPr lang="en-US" smtClean="0"/>
+              <a:rPr lang="en-US"/>
               <a:t>Fifth level</a:t>
             </a:r>
-            <a:endParaRPr lang="en-US"/>
           </a:p>
         </p:txBody>
       </p:sp>
@@ -2590,7 +2569,7 @@
           <a:p>
             <a:fld id="{95CF35B4-8310-4B5F-9FCA-57652201825D}" type="datetimeFigureOut">
               <a:rPr lang="en-US" smtClean="0"/>
-              <a:t>1/13/2023</a:t>
+              <a:t>11/17/2023</a:t>
             </a:fld>
             <a:endParaRPr lang="en-US"/>
           </a:p>
@@ -3011,10 +2990,9 @@
           <a:lstStyle/>
           <a:p>
             <a:r>
-              <a:rPr lang="en-US" dirty="0" smtClean="0"/>
+              <a:rPr lang="en-US" dirty="0"/>
               <a:t>Hospital Management System REST API</a:t>
             </a:r>
-            <a:endParaRPr lang="en-US" dirty="0"/>
           </a:p>
         </p:txBody>
       </p:sp>
@@ -3083,10 +3061,9 @@
           <a:lstStyle/>
           <a:p>
             <a:r>
-              <a:rPr lang="en-US" dirty="0" smtClean="0"/>
+              <a:rPr lang="en-US" dirty="0"/>
               <a:t>Folder description </a:t>
             </a:r>
-            <a:endParaRPr lang="en-US" dirty="0"/>
           </a:p>
         </p:txBody>
       </p:sp>
@@ -3108,24 +3085,20 @@
           <a:lstStyle/>
           <a:p>
             <a:r>
-              <a:rPr lang="en-US" dirty="0" err="1" smtClean="0"/>
+              <a:rPr lang="en-US" dirty="0" err="1"/>
               <a:t>Config</a:t>
             </a:r>
             <a:r>
-              <a:rPr lang="en-US" dirty="0" smtClean="0"/>
+              <a:rPr lang="en-US" dirty="0"/>
               <a:t> : This folder contains </a:t>
             </a:r>
             <a:r>
-              <a:rPr lang="en-US" dirty="0" err="1" smtClean="0"/>
+              <a:rPr lang="en-US" dirty="0" err="1"/>
               <a:t>dbConfig</a:t>
             </a:r>
             <a:r>
               <a:rPr lang="en-US" dirty="0"/>
-              <a:t> </a:t>
-            </a:r>
-            <a:r>
-              <a:rPr lang="en-US" dirty="0" smtClean="0"/>
-              <a:t>file which provide the database     connection details. </a:t>
+              <a:t> file which provide the database     connection details. </a:t>
             </a:r>
           </a:p>
           <a:p>
@@ -3134,41 +3107,32 @@
             </a:pPr>
             <a:r>
               <a:rPr lang="en-US" dirty="0"/>
-              <a:t> </a:t>
-            </a:r>
-            <a:r>
-              <a:rPr lang="en-US" dirty="0" smtClean="0"/>
-              <a:t>                 status file provide the dieses details. </a:t>
-            </a:r>
-          </a:p>
-          <a:p>
-            <a:r>
-              <a:rPr lang="en-US" dirty="0"/>
-              <a:t>Model </a:t>
-            </a:r>
-            <a:r>
-              <a:rPr lang="en-US" dirty="0" smtClean="0"/>
-              <a:t>: This folder contains more than model file which provide the structure for Doctor, Patient and Report collection schema details </a:t>
-            </a:r>
-          </a:p>
-          <a:p>
-            <a:r>
-              <a:rPr lang="en-US" dirty="0" smtClean="0"/>
+              <a:t>                  status file provide the dieses details. </a:t>
+            </a:r>
+          </a:p>
+          <a:p>
+            <a:r>
+              <a:rPr lang="en-US" dirty="0"/>
+              <a:t>Model : This folder contains more than model file which provide the structure for Doctor, Patient and Report collection schema details </a:t>
+            </a:r>
+          </a:p>
+          <a:p>
+            <a:r>
+              <a:rPr lang="en-US" dirty="0"/>
               <a:t>Controller : This folder contains more than controller file which contains set of method which help to do the operation on collection using model files. Which takes request from router file do the operation and provide the response to client. </a:t>
             </a:r>
           </a:p>
           <a:p>
             <a:r>
-              <a:rPr lang="en-US" dirty="0" smtClean="0"/>
+              <a:rPr lang="en-US" dirty="0"/>
               <a:t>Router : This folder contains more than one file which help to map the sub path and http method base upon the request. </a:t>
             </a:r>
           </a:p>
           <a:p>
             <a:r>
-              <a:rPr lang="en-US" dirty="0" smtClean="0"/>
+              <a:rPr lang="en-US" dirty="0"/>
               <a:t>App.js : This file in entry of the application. </a:t>
             </a:r>
-            <a:endParaRPr lang="en-US" dirty="0"/>
           </a:p>
         </p:txBody>
       </p:sp>
@@ -3218,10 +3182,9 @@
           <a:lstStyle/>
           <a:p>
             <a:r>
-              <a:rPr lang="en-US" dirty="0" smtClean="0"/>
+              <a:rPr lang="en-US" dirty="0"/>
               <a:t>Now run the app.js file using command as </a:t>
             </a:r>
-            <a:endParaRPr lang="en-US" dirty="0"/>
           </a:p>
         </p:txBody>
       </p:sp>
@@ -3247,37 +3210,32 @@
           <a:p>
             <a:r>
               <a:rPr lang="en-US" dirty="0"/>
-              <a:t>n</a:t>
-            </a:r>
-            <a:r>
-              <a:rPr lang="en-US" dirty="0" smtClean="0"/>
-              <a:t>ode app.js 	or      </a:t>
-            </a:r>
-            <a:r>
-              <a:rPr lang="en-US" dirty="0" err="1" smtClean="0"/>
+              <a:t>node app.js 	or      </a:t>
+            </a:r>
+            <a:r>
+              <a:rPr lang="en-US" dirty="0" err="1"/>
               <a:t>nodemon</a:t>
             </a:r>
             <a:r>
-              <a:rPr lang="en-US" dirty="0" smtClean="0"/>
+              <a:rPr lang="en-US" dirty="0"/>
               <a:t> app.js (before running this command install </a:t>
             </a:r>
             <a:r>
-              <a:rPr lang="en-US" dirty="0" err="1" smtClean="0"/>
+              <a:rPr lang="en-US" dirty="0" err="1"/>
               <a:t>npm</a:t>
             </a:r>
             <a:r>
-              <a:rPr lang="en-US" dirty="0" smtClean="0"/>
+              <a:rPr lang="en-US" dirty="0"/>
               <a:t> install –g </a:t>
             </a:r>
             <a:r>
-              <a:rPr lang="en-US" dirty="0" err="1" smtClean="0"/>
+              <a:rPr lang="en-US" dirty="0" err="1"/>
               <a:t>nodemon</a:t>
             </a:r>
             <a:r>
-              <a:rPr lang="en-US" dirty="0" smtClean="0"/>
+              <a:rPr lang="en-US" dirty="0"/>
               <a:t> </a:t>
             </a:r>
-            <a:endParaRPr lang="en-US" dirty="0"/>
           </a:p>
         </p:txBody>
       </p:sp>
@@ -3351,10 +3309,9 @@
           <a:lstStyle/>
           <a:p>
             <a:r>
-              <a:rPr lang="en-US" dirty="0" smtClean="0"/>
+              <a:rPr lang="en-US" dirty="0"/>
               <a:t>Now you can check all REST API using </a:t>
             </a:r>
-            <a:endParaRPr lang="en-US" dirty="0"/>
           </a:p>
         </p:txBody>
       </p:sp>
@@ -3374,44 +3331,43 @@
           <a:lstStyle/>
           <a:p>
             <a:r>
-              <a:rPr lang="en-US" dirty="0" smtClean="0"/>
+              <a:rPr lang="en-US" dirty="0"/>
               <a:t>REST client </a:t>
             </a:r>
           </a:p>
           <a:p>
             <a:r>
-              <a:rPr lang="en-US" dirty="0" smtClean="0"/>
+              <a:rPr lang="en-US" dirty="0"/>
               <a:t>POST Man tool </a:t>
             </a:r>
           </a:p>
           <a:p>
             <a:r>
-              <a:rPr lang="en-US" dirty="0" smtClean="0"/>
+              <a:rPr lang="en-US" dirty="0"/>
               <a:t>Command line client as </a:t>
             </a:r>
             <a:r>
-              <a:rPr lang="en-US" dirty="0" err="1" smtClean="0"/>
+              <a:rPr lang="en-US" dirty="0" err="1"/>
               <a:t>Git</a:t>
             </a:r>
             <a:r>
-              <a:rPr lang="en-US" dirty="0" smtClean="0"/>
+              <a:rPr lang="en-US" dirty="0"/>
               <a:t> </a:t>
             </a:r>
           </a:p>
           <a:p>
             <a:r>
-              <a:rPr lang="en-US" dirty="0" smtClean="0"/>
+              <a:rPr lang="en-US" dirty="0"/>
               <a:t>So we are using </a:t>
             </a:r>
             <a:r>
-              <a:rPr lang="en-US" dirty="0" err="1" smtClean="0"/>
+              <a:rPr lang="en-US" dirty="0" err="1"/>
               <a:t>Git</a:t>
             </a:r>
             <a:r>
-              <a:rPr lang="en-US" dirty="0" smtClean="0"/>
+              <a:rPr lang="en-US" dirty="0"/>
               <a:t> command prompt with CRL command to verify all rest API. </a:t>
             </a:r>
-            <a:endParaRPr lang="en-US" dirty="0"/>
           </a:p>
         </p:txBody>
       </p:sp>
@@ -3461,18 +3417,17 @@
           <a:lstStyle/>
           <a:p>
             <a:r>
-              <a:rPr lang="en-US" dirty="0" smtClean="0"/>
+              <a:rPr lang="en-US" dirty="0"/>
               <a:t>Please verify database created or not in mongo </a:t>
             </a:r>
             <a:r>
-              <a:rPr lang="en-US" dirty="0" err="1" smtClean="0"/>
+              <a:rPr lang="en-US" dirty="0" err="1"/>
               <a:t>db</a:t>
             </a:r>
             <a:r>
-              <a:rPr lang="en-US" dirty="0" smtClean="0"/>
+              <a:rPr lang="en-US" dirty="0"/>
               <a:t> database </a:t>
             </a:r>
-            <a:endParaRPr lang="en-US" dirty="0"/>
           </a:p>
         </p:txBody>
       </p:sp>
@@ -3492,7 +3447,7 @@
           <a:lstStyle/>
           <a:p>
             <a:r>
-              <a:rPr lang="en-US" dirty="0" smtClean="0"/>
+              <a:rPr lang="en-US" dirty="0"/>
               <a:t>Make sure database must be running </a:t>
             </a:r>
           </a:p>
@@ -3595,10 +3550,9 @@
           <a:lstStyle/>
           <a:p>
             <a:r>
-              <a:rPr lang="en-US" dirty="0" smtClean="0"/>
+              <a:rPr lang="en-US" dirty="0"/>
               <a:t>Doctor REST API </a:t>
             </a:r>
-            <a:endParaRPr lang="en-US" dirty="0"/>
           </a:p>
         </p:txBody>
       </p:sp>
@@ -3620,7 +3574,7 @@
           <a:lstStyle/>
           <a:p>
             <a:r>
-              <a:rPr lang="en-US" dirty="0" smtClean="0"/>
+              <a:rPr lang="en-US" dirty="0"/>
               <a:t>Post method : register for doctor details  </a:t>
             </a:r>
             <a:endParaRPr lang="en-US" dirty="0">
@@ -3630,125 +3584,61 @@
           <a:p>
             <a:pPr lvl="1"/>
             <a:r>
-              <a:rPr lang="en-US" dirty="0" smtClean="0">
+              <a:rPr lang="en-US" dirty="0">
                 <a:hlinkClick r:id="rId2"/>
               </a:rPr>
               <a:t>http://localhost:3000/api/doctor/register</a:t>
             </a:r>
-            <a:endParaRPr lang="en-US" dirty="0" smtClean="0"/>
-          </a:p>
-          <a:p>
-            <a:r>
-              <a:rPr lang="en-US" dirty="0" smtClean="0"/>
-              <a:t>Post </a:t>
-            </a:r>
-            <a:r>
-              <a:rPr lang="en-US" dirty="0"/>
-              <a:t>method : </a:t>
-            </a:r>
-            <a:r>
-              <a:rPr lang="en-US" dirty="0" smtClean="0"/>
-              <a:t>login for doctor </a:t>
+            <a:endParaRPr lang="en-US" dirty="0"/>
+          </a:p>
+          <a:p>
+            <a:r>
+              <a:rPr lang="en-US" dirty="0"/>
+              <a:t>Post method : login for doctor </a:t>
             </a:r>
           </a:p>
           <a:p>
             <a:pPr lvl="1"/>
             <a:r>
-              <a:rPr lang="en-US" dirty="0" smtClean="0"/>
-              <a:t>http</a:t>
-            </a:r>
-            <a:r>
-              <a:rPr lang="en-US" dirty="0"/>
-              <a:t>://</a:t>
-            </a:r>
-            <a:r>
-              <a:rPr lang="en-US" dirty="0" smtClean="0"/>
-              <a:t>localhost:3000/api/doctor/login</a:t>
-            </a:r>
-          </a:p>
-          <a:p>
-            <a:r>
-              <a:rPr lang="en-US" dirty="0" smtClean="0"/>
-              <a:t>Get </a:t>
-            </a:r>
-            <a:r>
-              <a:rPr lang="en-US" dirty="0"/>
-              <a:t>method : </a:t>
-            </a:r>
-            <a:r>
-              <a:rPr lang="en-US" dirty="0" smtClean="0"/>
-              <a:t>view all doctors </a:t>
-            </a:r>
-            <a:r>
-              <a:rPr lang="en-US" dirty="0"/>
-              <a:t>details</a:t>
-            </a:r>
-            <a:r>
-              <a:rPr lang="en-US" dirty="0" smtClean="0"/>
-              <a:t> </a:t>
+              <a:rPr lang="en-US" dirty="0"/>
+              <a:t>http://localhost:3000/api/doctor/login</a:t>
+            </a:r>
+          </a:p>
+          <a:p>
+            <a:r>
+              <a:rPr lang="en-US" dirty="0"/>
+              <a:t>Get method : view all doctors details </a:t>
             </a:r>
           </a:p>
           <a:p>
             <a:pPr lvl="1"/>
-            <a:r>
-              <a:rPr lang="en-US" dirty="0" smtClean="0">
-                <a:hlinkClick r:id="rId3"/>
-              </a:rPr>
-              <a:t>http</a:t>
-            </a:r>
             <a:r>
               <a:rPr lang="en-US" dirty="0">
                 <a:hlinkClick r:id="rId3"/>
               </a:rPr>
-              <a:t>://</a:t>
-            </a:r>
-            <a:r>
-              <a:rPr lang="en-US" dirty="0" smtClean="0">
-                <a:hlinkClick r:id="rId3"/>
-              </a:rPr>
-              <a:t>localhost:3000/api/doctor/viewDoctor</a:t>
-            </a:r>
-            <a:r>
-              <a:rPr lang="en-US" dirty="0" smtClean="0"/>
+              <a:t>http://localhost:3000/api/doctor/viewDoctor</a:t>
+            </a:r>
+            <a:r>
+              <a:rPr lang="en-US" dirty="0"/>
               <a:t> </a:t>
             </a:r>
           </a:p>
           <a:p>
             <a:r>
-              <a:rPr lang="en-US" dirty="0" smtClean="0"/>
-              <a:t>Put </a:t>
-            </a:r>
-            <a:r>
-              <a:rPr lang="en-US" dirty="0"/>
-              <a:t>method : </a:t>
-            </a:r>
-            <a:r>
-              <a:rPr lang="en-US" dirty="0" smtClean="0"/>
-              <a:t>change doctor password  </a:t>
+              <a:rPr lang="en-US" dirty="0"/>
+              <a:t>Put method : change doctor password  </a:t>
             </a:r>
           </a:p>
           <a:p>
             <a:pPr lvl="1"/>
-            <a:r>
-              <a:rPr lang="en-US" dirty="0" smtClean="0">
-                <a:hlinkClick r:id="rId4"/>
-              </a:rPr>
-              <a:t>http</a:t>
-            </a:r>
             <a:r>
               <a:rPr lang="en-US" dirty="0">
                 <a:hlinkClick r:id="rId4"/>
               </a:rPr>
-              <a:t>://</a:t>
-            </a:r>
-            <a:r>
-              <a:rPr lang="en-US" dirty="0" smtClean="0">
-                <a:hlinkClick r:id="rId4"/>
-              </a:rPr>
-              <a:t>localhost:3000/api/doctor/changePassword</a:t>
-            </a:r>
-            <a:r>
-              <a:rPr lang="en-US" dirty="0" smtClean="0"/>
+              <a:t>http://localhost:3000/api/doctor/changePassword</a:t>
+            </a:r>
+            <a:r>
+              <a:rPr lang="en-US" dirty="0"/>
               <a:t> </a:t>
             </a:r>
           </a:p>
@@ -3803,10 +3693,9 @@
           <a:lstStyle/>
           <a:p>
             <a:r>
-              <a:rPr lang="en-US" dirty="0" smtClean="0"/>
+              <a:rPr lang="en-US" dirty="0"/>
               <a:t>Patient REST API </a:t>
             </a:r>
-            <a:endParaRPr lang="en-US" dirty="0"/>
           </a:p>
         </p:txBody>
       </p:sp>
@@ -3826,35 +3715,27 @@
           <a:lstStyle/>
           <a:p>
             <a:r>
-              <a:rPr lang="en-US" dirty="0" smtClean="0"/>
+              <a:rPr lang="en-US" dirty="0"/>
               <a:t>Post method  : register for patient details </a:t>
             </a:r>
           </a:p>
           <a:p>
             <a:pPr lvl="1"/>
             <a:r>
-              <a:rPr lang="en-US" dirty="0" smtClean="0">
+              <a:rPr lang="en-US" dirty="0">
                 <a:hlinkClick r:id="rId2"/>
               </a:rPr>
               <a:t>http://localhost:3000/api/patient/register</a:t>
             </a:r>
             <a:r>
-              <a:rPr lang="en-US" dirty="0" smtClean="0"/>
+              <a:rPr lang="en-US" dirty="0"/>
               <a:t> </a:t>
             </a:r>
           </a:p>
           <a:p>
             <a:r>
-              <a:rPr lang="en-US" dirty="0" smtClean="0"/>
-              <a:t>Post </a:t>
-            </a:r>
-            <a:r>
-              <a:rPr lang="en-US" dirty="0"/>
-              <a:t>method  : </a:t>
-            </a:r>
-            <a:r>
-              <a:rPr lang="en-US" dirty="0" smtClean="0"/>
-              <a:t>patient can create the report  </a:t>
+              <a:rPr lang="en-US" dirty="0"/>
+              <a:t>Post method  : patient can create the report  </a:t>
             </a:r>
             <a:endParaRPr lang="en-US" dirty="0">
               <a:hlinkClick r:id="rId3"/>
@@ -3863,41 +3744,29 @@
           <a:p>
             <a:pPr lvl="1"/>
             <a:r>
-              <a:rPr lang="en-US" dirty="0" smtClean="0">
-                <a:hlinkClick r:id="rId4"/>
-              </a:rPr>
-              <a:t>http</a:t>
-            </a:r>
-            <a:r>
               <a:rPr lang="en-US" dirty="0">
                 <a:hlinkClick r:id="rId4"/>
               </a:rPr>
-              <a:t>://</a:t>
-            </a:r>
-            <a:r>
-              <a:rPr lang="en-US" dirty="0" smtClean="0">
-                <a:hlinkClick r:id="rId4"/>
-              </a:rPr>
-              <a:t>localhost:3000/api/patient/:id/createReport</a:t>
-            </a:r>
-            <a:r>
-              <a:rPr lang="en-US" dirty="0" smtClean="0"/>
+              <a:t>http://localhost:3000/api/patient/:id/createReport</a:t>
+            </a:r>
+            <a:r>
+              <a:rPr lang="en-US" dirty="0"/>
               <a:t> </a:t>
             </a:r>
           </a:p>
           <a:p>
             <a:r>
-              <a:rPr lang="en-US" dirty="0" smtClean="0"/>
+              <a:rPr lang="en-US" dirty="0"/>
               <a:t>Get method : Patient can view its own report </a:t>
             </a:r>
-            <a:endParaRPr lang="en-US" dirty="0" smtClean="0">
+            <a:endParaRPr lang="en-US" dirty="0">
               <a:hlinkClick r:id="rId3"/>
             </a:endParaRPr>
           </a:p>
           <a:p>
             <a:pPr lvl="1"/>
             <a:r>
-              <a:rPr lang="en-US" dirty="0" smtClean="0"/>
+              <a:rPr lang="en-US" dirty="0"/>
               <a:t>http://localhost:3000/api/patient/:id/viewPatientReports </a:t>
             </a:r>
           </a:p>
@@ -3952,10 +3821,9 @@
           <a:lstStyle/>
           <a:p>
             <a:r>
-              <a:rPr lang="en-US" dirty="0" smtClean="0"/>
+              <a:rPr lang="en-US" dirty="0"/>
               <a:t>Report REST API </a:t>
             </a:r>
-            <a:endParaRPr lang="en-US" dirty="0"/>
           </a:p>
         </p:txBody>
       </p:sp>
@@ -3975,46 +3843,30 @@
           <a:lstStyle/>
           <a:p>
             <a:r>
-              <a:rPr lang="en-US" dirty="0" smtClean="0"/>
+              <a:rPr lang="en-US" dirty="0"/>
               <a:t>Get method : fetch report by status </a:t>
             </a:r>
-            <a:endParaRPr lang="en-US" dirty="0" smtClean="0">
+            <a:endParaRPr lang="en-US" dirty="0">
               <a:hlinkClick r:id="rId2"/>
             </a:endParaRPr>
           </a:p>
           <a:p>
             <a:pPr lvl="1"/>
-            <a:r>
-              <a:rPr lang="en-US" dirty="0" smtClean="0">
-                <a:hlinkClick r:id="rId2"/>
-              </a:rPr>
-              <a:t>http</a:t>
-            </a:r>
             <a:r>
               <a:rPr lang="en-US" dirty="0">
                 <a:hlinkClick r:id="rId2"/>
               </a:rPr>
-              <a:t>://</a:t>
-            </a:r>
-            <a:r>
-              <a:rPr lang="en-US" dirty="0" smtClean="0">
-                <a:hlinkClick r:id="rId2"/>
-              </a:rPr>
-              <a:t>localhost:3000/api/report/0</a:t>
-            </a:r>
-            <a:endParaRPr lang="en-US" dirty="0" smtClean="0"/>
-          </a:p>
-          <a:p>
-            <a:endParaRPr lang="en-US" dirty="0" smtClean="0"/>
-          </a:p>
-          <a:p>
-            <a:r>
-              <a:rPr lang="en-US" dirty="0"/>
-              <a:t>Get method : fetch </a:t>
-            </a:r>
-            <a:r>
-              <a:rPr lang="en-US" dirty="0" smtClean="0"/>
-              <a:t>all reports  </a:t>
+              <a:t>http://localhost:3000/api/report/0</a:t>
+            </a:r>
+            <a:endParaRPr lang="en-US" dirty="0"/>
+          </a:p>
+          <a:p>
+            <a:endParaRPr lang="en-US" dirty="0"/>
+          </a:p>
+          <a:p>
+            <a:r>
+              <a:rPr lang="en-US" dirty="0"/>
+              <a:t>Get method : fetch all reports  </a:t>
             </a:r>
             <a:endParaRPr lang="en-US" dirty="0">
               <a:hlinkClick r:id="rId2"/>
@@ -4026,13 +3878,7 @@
               <a:rPr lang="en-US" dirty="0">
                 <a:hlinkClick r:id="rId2"/>
               </a:rPr>
-              <a:t>http://</a:t>
-            </a:r>
-            <a:r>
-              <a:rPr lang="en-US" dirty="0" smtClean="0">
-                <a:hlinkClick r:id="rId2"/>
-              </a:rPr>
-              <a:t>localhost:3000/api/report/fetchAllReports</a:t>
+              <a:t>http://localhost:3000/api/report/fetchAllReports</a:t>
             </a:r>
             <a:endParaRPr lang="en-US" dirty="0"/>
           </a:p>
@@ -4090,12 +3936,12 @@
           <a:p>
             <a:pPr lvl="1"/>
             <a:r>
-              <a:rPr lang="en-US" sz="3600" dirty="0" smtClean="0">
+              <a:rPr lang="en-US" sz="3600" dirty="0">
                 <a:hlinkClick r:id="rId2"/>
               </a:rPr>
               <a:t>http://localhost:3000/api/doctor/register</a:t>
             </a:r>
-            <a:endParaRPr lang="en-US" sz="3600" dirty="0" smtClean="0"/>
+            <a:endParaRPr lang="en-US" sz="3600" dirty="0"/>
           </a:p>
         </p:txBody>
       </p:sp>
@@ -4274,23 +4120,11 @@
             </a:r>
             <a:r>
               <a:rPr lang="en-US" dirty="0" err="1"/>
-              <a:t>Steven","email":"</a:t>
-            </a:r>
-            <a:r>
-              <a:rPr lang="en-US" dirty="0" err="1" smtClean="0"/>
-              <a:t>Steven@ggmail.com</a:t>
-            </a:r>
-            <a:r>
-              <a:rPr lang="en-US" dirty="0" smtClean="0"/>
-              <a:t>}' </a:t>
-            </a:r>
-            <a:r>
-              <a:rPr lang="en-US" dirty="0"/>
-              <a:t>http://</a:t>
-            </a:r>
-            <a:r>
-              <a:rPr lang="en-US" dirty="0" smtClean="0"/>
-              <a:t>localhost:3000/api/doctor/register</a:t>
+              <a:t>Steven","email":"Steven@ggmail.com</a:t>
+            </a:r>
+            <a:r>
+              <a:rPr lang="en-US" dirty="0"/>
+              <a:t>}' http://localhost:3000/api/doctor/register</a:t>
             </a:r>
           </a:p>
           <a:p>
@@ -4299,11 +4133,7 @@
             </a:pPr>
             <a:r>
               <a:rPr lang="en-US" dirty="0"/>
-              <a:t>	</a:t>
-            </a:r>
-            <a:r>
-              <a:rPr lang="en-US" dirty="0" smtClean="0"/>
-              <a:t>if we miss some property </a:t>
+              <a:t>	if we miss some property </a:t>
             </a:r>
           </a:p>
           <a:p>
@@ -4384,11 +4214,11 @@
           <a:lstStyle/>
           <a:p>
             <a:r>
-              <a:rPr lang="en-US" dirty="0" smtClean="0"/>
+              <a:rPr lang="en-US" dirty="0"/>
               <a:t>After stored all information view in </a:t>
             </a:r>
             <a:r>
-              <a:rPr lang="en-US" dirty="0" err="1" smtClean="0"/>
+              <a:rPr lang="en-US" dirty="0" err="1"/>
               <a:t>db</a:t>
             </a:r>
             <a:endParaRPr lang="en-US" dirty="0"/>
@@ -4467,10 +4297,9 @@
           <a:lstStyle/>
           <a:p>
             <a:r>
-              <a:rPr lang="en-US" dirty="0" smtClean="0"/>
+              <a:rPr lang="en-US" dirty="0"/>
               <a:t>Technologies use </a:t>
             </a:r>
-            <a:endParaRPr lang="en-US" dirty="0"/>
           </a:p>
         </p:txBody>
       </p:sp>
@@ -4490,51 +4319,51 @@
           <a:lstStyle/>
           <a:p>
             <a:r>
-              <a:rPr lang="en-US" dirty="0" smtClean="0"/>
+              <a:rPr lang="en-US" dirty="0"/>
               <a:t>Node JS </a:t>
             </a:r>
           </a:p>
           <a:p>
             <a:r>
-              <a:rPr lang="en-US" dirty="0" smtClean="0"/>
+              <a:rPr lang="en-US" dirty="0"/>
               <a:t>Express JS module </a:t>
             </a:r>
           </a:p>
           <a:p>
             <a:r>
-              <a:rPr lang="en-US" dirty="0" smtClean="0"/>
+              <a:rPr lang="en-US" dirty="0"/>
               <a:t>Mongoose </a:t>
             </a:r>
             <a:r>
-              <a:rPr lang="en-US" dirty="0" err="1" smtClean="0"/>
+              <a:rPr lang="en-US" dirty="0" err="1"/>
               <a:t>db</a:t>
             </a:r>
             <a:r>
-              <a:rPr lang="en-US" dirty="0" smtClean="0"/>
+              <a:rPr lang="en-US" dirty="0"/>
               <a:t> module </a:t>
             </a:r>
           </a:p>
           <a:p>
             <a:r>
-              <a:rPr lang="en-US" dirty="0" smtClean="0"/>
+              <a:rPr lang="en-US" dirty="0"/>
               <a:t>Mongo </a:t>
             </a:r>
             <a:r>
-              <a:rPr lang="en-US" dirty="0" err="1" smtClean="0"/>
+              <a:rPr lang="en-US" dirty="0" err="1"/>
               <a:t>db</a:t>
             </a:r>
             <a:r>
-              <a:rPr lang="en-US" dirty="0" smtClean="0"/>
+              <a:rPr lang="en-US" dirty="0"/>
               <a:t> database </a:t>
             </a:r>
           </a:p>
           <a:p>
             <a:r>
-              <a:rPr lang="en-US" dirty="0" err="1" smtClean="0"/>
+              <a:rPr lang="en-US" dirty="0" err="1"/>
               <a:t>Nodemon</a:t>
             </a:r>
             <a:r>
-              <a:rPr lang="en-US" dirty="0" smtClean="0"/>
+              <a:rPr lang="en-US" dirty="0"/>
               <a:t> module </a:t>
             </a:r>
           </a:p>
@@ -4590,13 +4419,8 @@
           <a:p>
             <a:r>
               <a:rPr lang="en-US" dirty="0"/>
-              <a:t>http://</a:t>
-            </a:r>
-            <a:r>
-              <a:rPr lang="en-US" dirty="0" smtClean="0"/>
-              <a:t>localhost:3000/api/doctor/login</a:t>
-            </a:r>
-            <a:endParaRPr lang="en-US" dirty="0"/>
+              <a:t>http://localhost:3000/api/doctor/login</a:t>
+            </a:r>
           </a:p>
         </p:txBody>
       </p:sp>
@@ -4720,10 +4544,9 @@
           <a:lstStyle/>
           <a:p>
             <a:r>
-              <a:rPr lang="en-US" dirty="0" smtClean="0"/>
+              <a:rPr lang="en-US" dirty="0"/>
               <a:t>http://localhost:3000/api/doctor/viewAllDoctors</a:t>
             </a:r>
-            <a:endParaRPr lang="en-US" dirty="0"/>
           </a:p>
         </p:txBody>
       </p:sp>
@@ -4823,16 +4646,15 @@
           <a:lstStyle/>
           <a:p>
             <a:r>
-              <a:rPr lang="en-US" dirty="0" smtClean="0">
+              <a:rPr lang="en-US" dirty="0">
                 <a:hlinkClick r:id="rId2"/>
               </a:rPr>
               <a:t>http://localhost:3000/api/patient/register</a:t>
             </a:r>
             <a:r>
-              <a:rPr lang="en-US" dirty="0" smtClean="0"/>
+              <a:rPr lang="en-US" dirty="0"/>
               <a:t> </a:t>
             </a:r>
-            <a:endParaRPr lang="en-US" dirty="0"/>
           </a:p>
         </p:txBody>
       </p:sp>
@@ -5041,13 +4863,8 @@
           <a:p>
             <a:r>
               <a:rPr lang="en-US" dirty="0"/>
-              <a:t>http://</a:t>
-            </a:r>
-            <a:r>
-              <a:rPr lang="en-US" dirty="0" smtClean="0"/>
-              <a:t>localhost:3000/api/patient/id/createReport</a:t>
-            </a:r>
-            <a:endParaRPr lang="en-US" dirty="0"/>
+              <a:t>http://localhost:3000/api/patient/id/createReport</a:t>
+            </a:r>
           </a:p>
         </p:txBody>
       </p:sp>
@@ -5067,23 +4884,23 @@
           <a:lstStyle/>
           <a:p>
             <a:r>
-              <a:rPr lang="en-US" dirty="0" smtClean="0"/>
+              <a:rPr lang="en-US" dirty="0"/>
               <a:t>We need to pass the patient id, doctor id and status </a:t>
             </a:r>
             <a:r>
-              <a:rPr lang="en-US" dirty="0" err="1" smtClean="0"/>
+              <a:rPr lang="en-US" dirty="0" err="1"/>
               <a:t>ie</a:t>
             </a:r>
             <a:r>
-              <a:rPr lang="en-US" dirty="0" smtClean="0"/>
+              <a:rPr lang="en-US" dirty="0"/>
               <a:t> present in status.js inside </a:t>
             </a:r>
             <a:r>
-              <a:rPr lang="en-US" dirty="0" err="1" smtClean="0"/>
+              <a:rPr lang="en-US" dirty="0" err="1"/>
               <a:t>config</a:t>
             </a:r>
             <a:r>
-              <a:rPr lang="en-US" dirty="0" smtClean="0"/>
+              <a:rPr lang="en-US" dirty="0"/>
               <a:t> file </a:t>
             </a:r>
           </a:p>
@@ -5186,10 +5003,9 @@
           <a:lstStyle/>
           <a:p>
             <a:r>
-              <a:rPr lang="en-US" dirty="0" smtClean="0"/>
+              <a:rPr lang="en-US" dirty="0"/>
               <a:t>http://localhost:3000/api/patient/id/viewPatientReports</a:t>
             </a:r>
-            <a:endParaRPr lang="en-US" dirty="0"/>
           </a:p>
         </p:txBody>
       </p:sp>
@@ -5289,11 +5105,11 @@
           <a:lstStyle/>
           <a:p>
             <a:r>
-              <a:rPr lang="en-US" dirty="0" smtClean="0"/>
+              <a:rPr lang="en-US" dirty="0"/>
               <a:t>http</a:t>
             </a:r>
             <a:r>
-              <a:rPr lang="en-US" smtClean="0"/>
+              <a:rPr lang="en-US"/>
               <a:t>://localhost:3000/api/reports/0/status</a:t>
             </a:r>
             <a:endParaRPr lang="en-US" dirty="0"/>
@@ -5396,10 +5212,9 @@
           <a:lstStyle/>
           <a:p>
             <a:r>
-              <a:rPr lang="en-US" dirty="0" smtClean="0"/>
+              <a:rPr lang="en-US" dirty="0"/>
               <a:t>http://localhost:3000/api/reports/fetchAllReports</a:t>
             </a:r>
-            <a:endParaRPr lang="en-US" dirty="0"/>
           </a:p>
         </p:txBody>
       </p:sp>
@@ -5475,24 +5290,29 @@
           <a:lstStyle/>
           <a:p>
             <a:r>
-              <a:rPr lang="en-US" dirty="0" smtClean="0"/>
+              <a:rPr lang="en-US" dirty="0"/>
               <a:t>First download the project from </a:t>
             </a:r>
             <a:r>
-              <a:rPr lang="en-US" dirty="0" err="1" smtClean="0"/>
+              <a:rPr lang="en-US" dirty="0" err="1"/>
               <a:t>git</a:t>
             </a:r>
             <a:r>
-              <a:rPr lang="en-US" dirty="0" smtClean="0"/>
+              <a:rPr lang="en-US" dirty="0"/>
               <a:t> </a:t>
             </a:r>
-            <a:endParaRPr lang="en-US" dirty="0"/>
           </a:p>
         </p:txBody>
       </p:sp>
       <p:pic>
         <p:nvPicPr>
-          <p:cNvPr id="4" name="Content Placeholder 3"/>
+          <p:cNvPr id="7" name="Content Placeholder 6">
+            <a:extLst>
+              <a:ext uri="{FF2B5EF4-FFF2-40B4-BE49-F238E27FC236}">
+                <a16:creationId xmlns:a16="http://schemas.microsoft.com/office/drawing/2014/main" id="{6985593C-2272-86B8-A5CF-EDE26B6C4FC9}"/>
+              </a:ext>
+            </a:extLst>
+          </p:cNvPr>
           <p:cNvPicPr>
             <a:picLocks noGrp="1" noChangeAspect="1"/>
           </p:cNvPicPr>
@@ -5508,12 +5328,9 @@
         </p:blipFill>
         <p:spPr>
           <a:xfrm>
-            <a:off x="2010222" y="1825625"/>
-            <a:ext cx="8171556" cy="4351338"/>
+            <a:off x="838200" y="1869255"/>
+            <a:ext cx="10515600" cy="4264078"/>
           </a:xfrm>
-          <a:prstGeom prst="rect">
-            <a:avLst/>
-          </a:prstGeom>
         </p:spPr>
       </p:pic>
     </p:spTree>
@@ -5562,18 +5379,17 @@
           <a:lstStyle/>
           <a:p>
             <a:r>
-              <a:rPr lang="en-US" dirty="0" smtClean="0"/>
+              <a:rPr lang="en-US" dirty="0"/>
               <a:t>Open the </a:t>
             </a:r>
             <a:r>
-              <a:rPr lang="en-US" dirty="0" err="1" smtClean="0"/>
+              <a:rPr lang="en-US" dirty="0" err="1"/>
               <a:t>package.json</a:t>
             </a:r>
             <a:r>
-              <a:rPr lang="en-US" dirty="0" smtClean="0"/>
+              <a:rPr lang="en-US" dirty="0"/>
               <a:t> file </a:t>
             </a:r>
-            <a:endParaRPr lang="en-US" dirty="0"/>
           </a:p>
         </p:txBody>
       </p:sp>
@@ -5649,10 +5465,9 @@
           <a:lstStyle/>
           <a:p>
             <a:r>
-              <a:rPr lang="en-US" dirty="0" smtClean="0"/>
+              <a:rPr lang="en-US" dirty="0"/>
               <a:t>Download required node module using command as </a:t>
             </a:r>
-            <a:endParaRPr lang="en-US" dirty="0"/>
           </a:p>
         </p:txBody>
       </p:sp>
@@ -5678,14 +5493,10 @@
           <a:p>
             <a:r>
               <a:rPr lang="en-US" dirty="0" err="1"/>
-              <a:t>n</a:t>
-            </a:r>
-            <a:r>
-              <a:rPr lang="en-US" dirty="0" err="1" smtClean="0"/>
-              <a:t>pm</a:t>
-            </a:r>
-            <a:r>
-              <a:rPr lang="en-US" dirty="0" smtClean="0"/>
+              <a:t>npm</a:t>
+            </a:r>
+            <a:r>
+              <a:rPr lang="en-US" dirty="0"/>
               <a:t> install </a:t>
             </a:r>
           </a:p>
@@ -5764,18 +5575,17 @@
           <a:lstStyle/>
           <a:p>
             <a:r>
-              <a:rPr lang="en-US" dirty="0" smtClean="0"/>
+              <a:rPr lang="en-US" dirty="0"/>
               <a:t>Install mongo </a:t>
             </a:r>
             <a:r>
-              <a:rPr lang="en-US" dirty="0" err="1" smtClean="0"/>
+              <a:rPr lang="en-US" dirty="0" err="1"/>
               <a:t>db</a:t>
             </a:r>
             <a:r>
-              <a:rPr lang="en-US" dirty="0" smtClean="0"/>
+              <a:rPr lang="en-US" dirty="0"/>
               <a:t> database in your machine </a:t>
             </a:r>
-            <a:endParaRPr lang="en-US" dirty="0"/>
           </a:p>
         </p:txBody>
       </p:sp>
@@ -5851,18 +5661,17 @@
           <a:lstStyle/>
           <a:p>
             <a:r>
-              <a:rPr lang="en-US" dirty="0" smtClean="0"/>
+              <a:rPr lang="en-US" dirty="0"/>
               <a:t>Now start mongo </a:t>
             </a:r>
             <a:r>
-              <a:rPr lang="en-US" dirty="0" err="1" smtClean="0"/>
+              <a:rPr lang="en-US" dirty="0" err="1"/>
               <a:t>db</a:t>
             </a:r>
             <a:r>
-              <a:rPr lang="en-US" dirty="0" smtClean="0"/>
+              <a:rPr lang="en-US" dirty="0"/>
               <a:t> database </a:t>
             </a:r>
-            <a:endParaRPr lang="en-US" dirty="0"/>
           </a:p>
         </p:txBody>
       </p:sp>
@@ -5888,17 +5697,12 @@
           <a:p>
             <a:r>
               <a:rPr lang="en-US" dirty="0" err="1"/>
-              <a:t>m</a:t>
-            </a:r>
-            <a:r>
-              <a:rPr lang="en-US" dirty="0" err="1" smtClean="0"/>
-              <a:t>ongod</a:t>
-            </a:r>
-            <a:r>
-              <a:rPr lang="en-US" dirty="0" smtClean="0"/>
+              <a:t>mongod</a:t>
+            </a:r>
+            <a:r>
+              <a:rPr lang="en-US" dirty="0"/>
               <a:t> </a:t>
             </a:r>
-            <a:endParaRPr lang="en-US" dirty="0"/>
           </a:p>
         </p:txBody>
       </p:sp>
@@ -5972,10 +5776,9 @@
           <a:lstStyle/>
           <a:p>
             <a:r>
-              <a:rPr lang="en-US" dirty="0" smtClean="0"/>
+              <a:rPr lang="en-US" dirty="0"/>
               <a:t>Now open mongo terminal </a:t>
             </a:r>
-            <a:endParaRPr lang="en-US" dirty="0"/>
           </a:p>
         </p:txBody>
       </p:sp>
@@ -6001,11 +5804,7 @@
           <a:p>
             <a:r>
               <a:rPr lang="en-US" dirty="0"/>
-              <a:t>m</a:t>
-            </a:r>
-            <a:r>
-              <a:rPr lang="en-US" dirty="0" smtClean="0"/>
-              <a:t>ongo </a:t>
+              <a:t>mongo </a:t>
             </a:r>
           </a:p>
           <a:p>
@@ -6083,18 +5882,17 @@
           <a:lstStyle/>
           <a:p>
             <a:r>
-              <a:rPr lang="en-US" dirty="0" smtClean="0"/>
+              <a:rPr lang="en-US" dirty="0"/>
               <a:t>Express </a:t>
             </a:r>
             <a:r>
-              <a:rPr lang="en-US" dirty="0" err="1" smtClean="0"/>
+              <a:rPr lang="en-US" dirty="0" err="1"/>
               <a:t>js</a:t>
             </a:r>
             <a:r>
-              <a:rPr lang="en-US" dirty="0" smtClean="0"/>
+              <a:rPr lang="en-US" dirty="0"/>
               <a:t> project structure </a:t>
             </a:r>
-            <a:endParaRPr lang="en-US" dirty="0"/>
           </a:p>
         </p:txBody>
       </p:sp>

</xml_diff>